<commit_message>
Updated several exercises relating to SWC 2.semester
...plus a couple of minor updates to presentations
</commit_message>
<xml_diff>
--- a/CSharpProgramming/Presentations/ProgPartI/ArithmeticConversion.pptx
+++ b/CSharpProgramming/Presentations/ProgPartI/ArithmeticConversion.pptx
@@ -6,14 +6,13 @@
   </p:sldMasterIdLst>
   <p:sldIdLst>
     <p:sldId id="271" r:id="rId2"/>
-    <p:sldId id="284" r:id="rId3"/>
-    <p:sldId id="291" r:id="rId4"/>
-    <p:sldId id="292" r:id="rId5"/>
-    <p:sldId id="293" r:id="rId6"/>
-    <p:sldId id="294" r:id="rId7"/>
-    <p:sldId id="295" r:id="rId8"/>
-    <p:sldId id="296" r:id="rId9"/>
-    <p:sldId id="297" r:id="rId10"/>
+    <p:sldId id="291" r:id="rId3"/>
+    <p:sldId id="292" r:id="rId4"/>
+    <p:sldId id="293" r:id="rId5"/>
+    <p:sldId id="294" r:id="rId6"/>
+    <p:sldId id="295" r:id="rId7"/>
+    <p:sldId id="296" r:id="rId8"/>
+    <p:sldId id="297" r:id="rId9"/>
   </p:sldIdLst>
   <p:sldSz cx="12192000" cy="6858000"/>
   <p:notesSz cx="6858000" cy="9144000"/>
@@ -251,7 +250,7 @@
           <a:p>
             <a:fld id="{E15B7D8E-2A20-4C0E-991C-872DBB7459A8}" type="datetimeFigureOut">
               <a:rPr lang="da-DK" smtClean="0"/>
-              <a:t>01-02-2018</a:t>
+              <a:t>11-02-2018</a:t>
             </a:fld>
             <a:endParaRPr lang="da-DK"/>
           </a:p>
@@ -421,7 +420,7 @@
           <a:p>
             <a:fld id="{E15B7D8E-2A20-4C0E-991C-872DBB7459A8}" type="datetimeFigureOut">
               <a:rPr lang="da-DK" smtClean="0"/>
-              <a:t>01-02-2018</a:t>
+              <a:t>11-02-2018</a:t>
             </a:fld>
             <a:endParaRPr lang="da-DK"/>
           </a:p>
@@ -601,7 +600,7 @@
           <a:p>
             <a:fld id="{E15B7D8E-2A20-4C0E-991C-872DBB7459A8}" type="datetimeFigureOut">
               <a:rPr lang="da-DK" smtClean="0"/>
-              <a:t>01-02-2018</a:t>
+              <a:t>11-02-2018</a:t>
             </a:fld>
             <a:endParaRPr lang="da-DK"/>
           </a:p>
@@ -771,7 +770,7 @@
           <a:p>
             <a:fld id="{E15B7D8E-2A20-4C0E-991C-872DBB7459A8}" type="datetimeFigureOut">
               <a:rPr lang="da-DK" smtClean="0"/>
-              <a:t>01-02-2018</a:t>
+              <a:t>11-02-2018</a:t>
             </a:fld>
             <a:endParaRPr lang="da-DK"/>
           </a:p>
@@ -1017,7 +1016,7 @@
           <a:p>
             <a:fld id="{E15B7D8E-2A20-4C0E-991C-872DBB7459A8}" type="datetimeFigureOut">
               <a:rPr lang="da-DK" smtClean="0"/>
-              <a:t>01-02-2018</a:t>
+              <a:t>11-02-2018</a:t>
             </a:fld>
             <a:endParaRPr lang="da-DK"/>
           </a:p>
@@ -1249,7 +1248,7 @@
           <a:p>
             <a:fld id="{E15B7D8E-2A20-4C0E-991C-872DBB7459A8}" type="datetimeFigureOut">
               <a:rPr lang="da-DK" smtClean="0"/>
-              <a:t>01-02-2018</a:t>
+              <a:t>11-02-2018</a:t>
             </a:fld>
             <a:endParaRPr lang="da-DK"/>
           </a:p>
@@ -1616,7 +1615,7 @@
           <a:p>
             <a:fld id="{E15B7D8E-2A20-4C0E-991C-872DBB7459A8}" type="datetimeFigureOut">
               <a:rPr lang="da-DK" smtClean="0"/>
-              <a:t>01-02-2018</a:t>
+              <a:t>11-02-2018</a:t>
             </a:fld>
             <a:endParaRPr lang="da-DK"/>
           </a:p>
@@ -1734,7 +1733,7 @@
           <a:p>
             <a:fld id="{E15B7D8E-2A20-4C0E-991C-872DBB7459A8}" type="datetimeFigureOut">
               <a:rPr lang="da-DK" smtClean="0"/>
-              <a:t>01-02-2018</a:t>
+              <a:t>11-02-2018</a:t>
             </a:fld>
             <a:endParaRPr lang="da-DK"/>
           </a:p>
@@ -1829,7 +1828,7 @@
           <a:p>
             <a:fld id="{E15B7D8E-2A20-4C0E-991C-872DBB7459A8}" type="datetimeFigureOut">
               <a:rPr lang="da-DK" smtClean="0"/>
-              <a:t>01-02-2018</a:t>
+              <a:t>11-02-2018</a:t>
             </a:fld>
             <a:endParaRPr lang="da-DK"/>
           </a:p>
@@ -2106,7 +2105,7 @@
           <a:p>
             <a:fld id="{E15B7D8E-2A20-4C0E-991C-872DBB7459A8}" type="datetimeFigureOut">
               <a:rPr lang="da-DK" smtClean="0"/>
-              <a:t>01-02-2018</a:t>
+              <a:t>11-02-2018</a:t>
             </a:fld>
             <a:endParaRPr lang="da-DK"/>
           </a:p>
@@ -2359,7 +2358,7 @@
           <a:p>
             <a:fld id="{E15B7D8E-2A20-4C0E-991C-872DBB7459A8}" type="datetimeFigureOut">
               <a:rPr lang="da-DK" smtClean="0"/>
-              <a:t>01-02-2018</a:t>
+              <a:t>11-02-2018</a:t>
             </a:fld>
             <a:endParaRPr lang="da-DK"/>
           </a:p>
@@ -2572,7 +2571,7 @@
           <a:p>
             <a:fld id="{E15B7D8E-2A20-4C0E-991C-872DBB7459A8}" type="datetimeFigureOut">
               <a:rPr lang="da-DK" smtClean="0"/>
-              <a:t>01-02-2018</a:t>
+              <a:t>11-02-2018</a:t>
             </a:fld>
             <a:endParaRPr lang="da-DK"/>
           </a:p>
@@ -3064,8 +3063,8 @@
         </p:nvSpPr>
         <p:spPr>
           <a:xfrm>
-            <a:off x="952500" y="2382253"/>
-            <a:ext cx="10341293" cy="1323439"/>
+            <a:off x="1313447" y="920416"/>
+            <a:ext cx="9530173" cy="1569660"/>
           </a:xfrm>
           <a:prstGeom prst="rect">
             <a:avLst/>
@@ -3079,74 +3078,159 @@
           <a:lstStyle/>
           <a:p>
             <a:r>
-              <a:rPr lang="da-DK" sz="8000" smtClean="0">
-                <a:solidFill>
-                  <a:schemeClr val="accent1">
-                    <a:lumMod val="60000"/>
-                    <a:lumOff val="40000"/>
-                  </a:schemeClr>
-                </a:solidFill>
-                <a:latin typeface="Consolas" panose="020B0609020204030204" pitchFamily="49" charset="0"/>
-              </a:rPr>
-              <a:t>int</a:t>
-            </a:r>
-            <a:r>
-              <a:rPr lang="da-DK" sz="8000" smtClean="0">
+              <a:rPr lang="en-US" sz="2400">
+                <a:solidFill>
+                  <a:srgbClr val="0070C0"/>
+                </a:solidFill>
+                <a:latin typeface="Consolas" panose="020B0609020204030204" pitchFamily="49" charset="0"/>
+              </a:rPr>
+              <a:t>double</a:t>
+            </a:r>
+            <a:r>
+              <a:rPr lang="en-US" sz="2400">
                 <a:latin typeface="Consolas" panose="020B0609020204030204" pitchFamily="49" charset="0"/>
               </a:rPr>
               <a:t> </a:t>
             </a:r>
             <a:r>
-              <a:rPr lang="da-DK" sz="8000" smtClean="0">
-                <a:solidFill>
-                  <a:schemeClr val="bg2">
-                    <a:lumMod val="75000"/>
-                  </a:schemeClr>
-                </a:solidFill>
-                <a:latin typeface="Consolas" panose="020B0609020204030204" pitchFamily="49" charset="0"/>
-              </a:rPr>
-              <a:t>age</a:t>
-            </a:r>
-            <a:r>
-              <a:rPr lang="da-DK" sz="8000" smtClean="0">
+              <a:rPr lang="en-US" sz="2400" smtClean="0">
+                <a:latin typeface="Consolas" panose="020B0609020204030204" pitchFamily="49" charset="0"/>
+              </a:rPr>
+              <a:t>netPrice </a:t>
+            </a:r>
+            <a:r>
+              <a:rPr lang="en-US" sz="2400">
+                <a:latin typeface="Consolas" panose="020B0609020204030204" pitchFamily="49" charset="0"/>
+              </a:rPr>
+              <a:t>= </a:t>
+            </a:r>
+            <a:r>
+              <a:rPr lang="en-US" sz="2400" smtClean="0">
+                <a:latin typeface="Consolas" panose="020B0609020204030204" pitchFamily="49" charset="0"/>
+              </a:rPr>
+              <a:t>25.50</a:t>
+            </a:r>
+            <a:r>
+              <a:rPr lang="en-US" sz="2400">
+                <a:latin typeface="Consolas" panose="020B0609020204030204" pitchFamily="49" charset="0"/>
+              </a:rPr>
+              <a:t>;</a:t>
+            </a:r>
+            <a:endParaRPr lang="da-DK" sz="2400">
+              <a:latin typeface="Consolas" panose="020B0609020204030204" pitchFamily="49" charset="0"/>
+            </a:endParaRPr>
+          </a:p>
+          <a:p>
+            <a:r>
+              <a:rPr lang="en-US" sz="2400">
+                <a:solidFill>
+                  <a:srgbClr val="0070C0"/>
+                </a:solidFill>
+                <a:latin typeface="Consolas" panose="020B0609020204030204" pitchFamily="49" charset="0"/>
+              </a:rPr>
+              <a:t>double</a:t>
+            </a:r>
+            <a:r>
+              <a:rPr lang="en-US" sz="2400" smtClean="0">
+                <a:latin typeface="Consolas" panose="020B0609020204030204" pitchFamily="49" charset="0"/>
+              </a:rPr>
+              <a:t> shipping </a:t>
+            </a:r>
+            <a:r>
+              <a:rPr lang="en-US" sz="2400">
+                <a:latin typeface="Consolas" panose="020B0609020204030204" pitchFamily="49" charset="0"/>
+              </a:rPr>
+              <a:t>= </a:t>
+            </a:r>
+            <a:r>
+              <a:rPr lang="en-US" sz="2400" smtClean="0">
+                <a:latin typeface="Consolas" panose="020B0609020204030204" pitchFamily="49" charset="0"/>
+              </a:rPr>
+              <a:t>6.75;</a:t>
+            </a:r>
+            <a:endParaRPr lang="da-DK" sz="2400">
+              <a:latin typeface="Consolas" panose="020B0609020204030204" pitchFamily="49" charset="0"/>
+            </a:endParaRPr>
+          </a:p>
+          <a:p>
+            <a:r>
+              <a:rPr lang="en-US" sz="2400">
+                <a:solidFill>
+                  <a:srgbClr val="0070C0"/>
+                </a:solidFill>
+                <a:latin typeface="Consolas" panose="020B0609020204030204" pitchFamily="49" charset="0"/>
+              </a:rPr>
+              <a:t>double</a:t>
+            </a:r>
+            <a:r>
+              <a:rPr lang="en-US" sz="2400" smtClean="0">
+                <a:latin typeface="Consolas" panose="020B0609020204030204" pitchFamily="49" charset="0"/>
+              </a:rPr>
+              <a:t> tax </a:t>
+            </a:r>
+            <a:r>
+              <a:rPr lang="en-US" sz="2400">
+                <a:latin typeface="Consolas" panose="020B0609020204030204" pitchFamily="49" charset="0"/>
+              </a:rPr>
+              <a:t>= 0.08;</a:t>
+            </a:r>
+            <a:endParaRPr lang="da-DK" sz="2400">
+              <a:latin typeface="Consolas" panose="020B0609020204030204" pitchFamily="49" charset="0"/>
+            </a:endParaRPr>
+          </a:p>
+          <a:p>
+            <a:r>
+              <a:rPr lang="en-US" sz="2400">
+                <a:solidFill>
+                  <a:srgbClr val="0070C0"/>
+                </a:solidFill>
+                <a:latin typeface="Consolas" panose="020B0609020204030204" pitchFamily="49" charset="0"/>
+              </a:rPr>
+              <a:t>double</a:t>
+            </a:r>
+            <a:r>
+              <a:rPr lang="en-US" sz="2400" smtClean="0">
+                <a:latin typeface="Consolas" panose="020B0609020204030204" pitchFamily="49" charset="0"/>
+              </a:rPr>
+              <a:t> totalPrice </a:t>
+            </a:r>
+            <a:r>
+              <a:rPr lang="en-US" sz="2400">
+                <a:latin typeface="Consolas" panose="020B0609020204030204" pitchFamily="49" charset="0"/>
+              </a:rPr>
+              <a:t>= netPrice</a:t>
+            </a:r>
+            <a:r>
+              <a:rPr lang="en-US" sz="2400" smtClean="0">
                 <a:latin typeface="Consolas" panose="020B0609020204030204" pitchFamily="49" charset="0"/>
               </a:rPr>
               <a:t> </a:t>
             </a:r>
             <a:r>
-              <a:rPr lang="da-DK" sz="8000" smtClean="0">
-                <a:solidFill>
-                  <a:schemeClr val="bg2">
-                    <a:lumMod val="75000"/>
-                  </a:schemeClr>
-                </a:solidFill>
-                <a:latin typeface="Consolas" panose="020B0609020204030204" pitchFamily="49" charset="0"/>
-              </a:rPr>
-              <a:t>=</a:t>
-            </a:r>
-            <a:r>
-              <a:rPr lang="da-DK" sz="8000" smtClean="0">
-                <a:latin typeface="Consolas" panose="020B0609020204030204" pitchFamily="49" charset="0"/>
-              </a:rPr>
-              <a:t> age + 2</a:t>
-            </a:r>
-            <a:r>
-              <a:rPr lang="da-DK" sz="8000" smtClean="0">
-                <a:solidFill>
-                  <a:schemeClr val="bg2">
-                    <a:lumMod val="75000"/>
-                  </a:schemeClr>
-                </a:solidFill>
+              <a:rPr lang="en-US" sz="2400">
+                <a:latin typeface="Consolas" panose="020B0609020204030204" pitchFamily="49" charset="0"/>
+              </a:rPr>
+              <a:t>* (1.00 + tax</a:t>
+            </a:r>
+            <a:r>
+              <a:rPr lang="en-US" sz="2400" smtClean="0">
+                <a:latin typeface="Consolas" panose="020B0609020204030204" pitchFamily="49" charset="0"/>
+              </a:rPr>
+              <a:t>) </a:t>
+            </a:r>
+            <a:r>
+              <a:rPr lang="en-US" sz="2400">
+                <a:latin typeface="Consolas" panose="020B0609020204030204" pitchFamily="49" charset="0"/>
+              </a:rPr>
+              <a:t>+ shipping</a:t>
+            </a:r>
+            <a:r>
+              <a:rPr lang="da-DK" sz="2400" smtClean="0">
                 <a:latin typeface="Consolas" panose="020B0609020204030204" pitchFamily="49" charset="0"/>
               </a:rPr>
               <a:t>;</a:t>
             </a:r>
-            <a:endParaRPr lang="da-DK" sz="8000">
-              <a:solidFill>
-                <a:schemeClr val="bg2">
-                  <a:lumMod val="75000"/>
-                </a:schemeClr>
-              </a:solidFill>
+            <a:endParaRPr lang="da-DK" sz="2400">
               <a:latin typeface="Consolas" panose="020B0609020204030204" pitchFamily="49" charset="0"/>
             </a:endParaRPr>
           </a:p>
@@ -3155,7 +3239,7 @@
     </p:spTree>
     <p:extLst>
       <p:ext uri="{BB962C8B-B14F-4D97-AF65-F5344CB8AC3E}">
-        <p14:creationId xmlns:p14="http://schemas.microsoft.com/office/powerpoint/2010/main" val="1722387299"/>
+        <p14:creationId xmlns:p14="http://schemas.microsoft.com/office/powerpoint/2010/main" val="771380864"/>
       </p:ext>
     </p:extLst>
   </p:cSld>
@@ -3198,7 +3282,7 @@
         <p:spPr>
           <a:xfrm>
             <a:off x="1313447" y="920416"/>
-            <a:ext cx="9530173" cy="1569660"/>
+            <a:ext cx="10719601" cy="1200329"/>
           </a:xfrm>
           <a:prstGeom prst="rect">
             <a:avLst/>
@@ -3212,43 +3296,19 @@
           <a:lstStyle/>
           <a:p>
             <a:r>
-              <a:rPr lang="en-US" sz="2400">
+              <a:rPr lang="en-US" sz="2400" smtClean="0">
                 <a:solidFill>
                   <a:srgbClr val="0070C0"/>
                 </a:solidFill>
                 <a:latin typeface="Consolas" panose="020B0609020204030204" pitchFamily="49" charset="0"/>
               </a:rPr>
-              <a:t>double</a:t>
-            </a:r>
-            <a:r>
-              <a:rPr lang="en-US" sz="2400">
-                <a:latin typeface="Consolas" panose="020B0609020204030204" pitchFamily="49" charset="0"/>
-              </a:rPr>
-              <a:t> </a:t>
+              <a:t>int</a:t>
             </a:r>
             <a:r>
               <a:rPr lang="en-US" sz="2400" smtClean="0">
                 <a:latin typeface="Consolas" panose="020B0609020204030204" pitchFamily="49" charset="0"/>
               </a:rPr>
-              <a:t>netPrice </a:t>
-            </a:r>
-            <a:r>
-              <a:rPr lang="en-US" sz="2400">
-                <a:latin typeface="Consolas" panose="020B0609020204030204" pitchFamily="49" charset="0"/>
-              </a:rPr>
-              <a:t>= </a:t>
-            </a:r>
-            <a:r>
-              <a:rPr lang="en-US" sz="2400" smtClean="0">
-                <a:latin typeface="Consolas" panose="020B0609020204030204" pitchFamily="49" charset="0"/>
-              </a:rPr>
-              <a:t>25.50</a:t>
-            </a:r>
-            <a:r>
-              <a:rPr lang="en-US" sz="2400">
-                <a:latin typeface="Consolas" panose="020B0609020204030204" pitchFamily="49" charset="0"/>
-              </a:rPr>
-              <a:t>;</a:t>
+              <a:t> age = 24;</a:t>
             </a:r>
             <a:endParaRPr lang="da-DK" sz="2400">
               <a:latin typeface="Consolas" panose="020B0609020204030204" pitchFamily="49" charset="0"/>
@@ -3268,7 +3328,7 @@
               <a:rPr lang="en-US" sz="2400" smtClean="0">
                 <a:latin typeface="Consolas" panose="020B0609020204030204" pitchFamily="49" charset="0"/>
               </a:rPr>
-              <a:t> shipping </a:t>
+              <a:t> someNumber </a:t>
             </a:r>
             <a:r>
               <a:rPr lang="en-US" sz="2400">
@@ -3280,7 +3340,7 @@
               <a:rPr lang="en-US" sz="2400" smtClean="0">
                 <a:latin typeface="Consolas" panose="020B0609020204030204" pitchFamily="49" charset="0"/>
               </a:rPr>
-              <a:t>6.75;</a:t>
+              <a:t>1.3;</a:t>
             </a:r>
             <a:endParaRPr lang="da-DK" sz="2400">
               <a:latin typeface="Consolas" panose="020B0609020204030204" pitchFamily="49" charset="0"/>
@@ -3288,92 +3348,59 @@
           </a:p>
           <a:p>
             <a:r>
+              <a:rPr lang="en-US" sz="2400" smtClean="0">
+                <a:solidFill>
+                  <a:schemeClr val="accent6">
+                    <a:lumMod val="75000"/>
+                  </a:schemeClr>
+                </a:solidFill>
+                <a:latin typeface="Consolas" panose="020B0609020204030204" pitchFamily="49" charset="0"/>
+              </a:rPr>
+              <a:t>Console</a:t>
+            </a:r>
+            <a:r>
+              <a:rPr lang="en-US" sz="2400" smtClean="0">
+                <a:latin typeface="Consolas" panose="020B0609020204030204" pitchFamily="49" charset="0"/>
+              </a:rPr>
+              <a:t>.WriteLine</a:t>
+            </a:r>
+            <a:r>
               <a:rPr lang="en-US" sz="2400">
                 <a:solidFill>
-                  <a:srgbClr val="0070C0"/>
-                </a:solidFill>
-                <a:latin typeface="Consolas" panose="020B0609020204030204" pitchFamily="49" charset="0"/>
-              </a:rPr>
-              <a:t>double</a:t>
-            </a:r>
-            <a:r>
-              <a:rPr lang="en-US" sz="2400" smtClean="0">
-                <a:latin typeface="Consolas" panose="020B0609020204030204" pitchFamily="49" charset="0"/>
-              </a:rPr>
-              <a:t> tax </a:t>
+                  <a:srgbClr val="C00000"/>
+                </a:solidFill>
+                <a:latin typeface="Consolas" panose="020B0609020204030204" pitchFamily="49" charset="0"/>
+              </a:rPr>
+              <a:t>("Dividing age by 1.3 is " </a:t>
             </a:r>
             <a:r>
               <a:rPr lang="en-US" sz="2400">
                 <a:latin typeface="Consolas" panose="020B0609020204030204" pitchFamily="49" charset="0"/>
               </a:rPr>
-              <a:t>= 0.08;</a:t>
+              <a:t>+ </a:t>
+            </a:r>
+            <a:r>
+              <a:rPr lang="en-US" sz="2400" b="1">
+                <a:latin typeface="Consolas" panose="020B0609020204030204" pitchFamily="49" charset="0"/>
+              </a:rPr>
+              <a:t>age/someNumber</a:t>
+            </a:r>
+            <a:r>
+              <a:rPr lang="en-US" sz="2400">
+                <a:latin typeface="Consolas" panose="020B0609020204030204" pitchFamily="49" charset="0"/>
+              </a:rPr>
+              <a:t>);</a:t>
             </a:r>
             <a:endParaRPr lang="da-DK" sz="2400">
               <a:latin typeface="Consolas" panose="020B0609020204030204" pitchFamily="49" charset="0"/>
             </a:endParaRPr>
           </a:p>
-          <a:p>
-            <a:r>
-              <a:rPr lang="en-US" sz="2400">
-                <a:solidFill>
-                  <a:srgbClr val="0070C0"/>
-                </a:solidFill>
-                <a:latin typeface="Consolas" panose="020B0609020204030204" pitchFamily="49" charset="0"/>
-              </a:rPr>
-              <a:t>double</a:t>
-            </a:r>
-            <a:r>
-              <a:rPr lang="en-US" sz="2400" smtClean="0">
-                <a:latin typeface="Consolas" panose="020B0609020204030204" pitchFamily="49" charset="0"/>
-              </a:rPr>
-              <a:t> totalPrice </a:t>
-            </a:r>
-            <a:r>
-              <a:rPr lang="en-US" sz="2400">
-                <a:latin typeface="Consolas" panose="020B0609020204030204" pitchFamily="49" charset="0"/>
-              </a:rPr>
-              <a:t>= netPrice</a:t>
-            </a:r>
-            <a:r>
-              <a:rPr lang="en-US" sz="2400" smtClean="0">
-                <a:latin typeface="Consolas" panose="020B0609020204030204" pitchFamily="49" charset="0"/>
-              </a:rPr>
-              <a:t> </a:t>
-            </a:r>
-            <a:r>
-              <a:rPr lang="en-US" sz="2400">
-                <a:latin typeface="Consolas" panose="020B0609020204030204" pitchFamily="49" charset="0"/>
-              </a:rPr>
-              <a:t>* (1.00 + tax</a:t>
-            </a:r>
-            <a:r>
-              <a:rPr lang="en-US" sz="2400" smtClean="0">
-                <a:latin typeface="Consolas" panose="020B0609020204030204" pitchFamily="49" charset="0"/>
-              </a:rPr>
-              <a:t>) </a:t>
-            </a:r>
-            <a:r>
-              <a:rPr lang="en-US" sz="2400">
-                <a:latin typeface="Consolas" panose="020B0609020204030204" pitchFamily="49" charset="0"/>
-              </a:rPr>
-              <a:t>+ shipping</a:t>
-            </a:r>
-            <a:r>
-              <a:rPr lang="da-DK" sz="2400" smtClean="0">
-                <a:latin typeface="Consolas" panose="020B0609020204030204" pitchFamily="49" charset="0"/>
-              </a:rPr>
-              <a:t>;</a:t>
-            </a:r>
-            <a:endParaRPr lang="da-DK" sz="2400">
-              <a:latin typeface="Consolas" panose="020B0609020204030204" pitchFamily="49" charset="0"/>
-            </a:endParaRPr>
-          </a:p>
         </p:txBody>
       </p:sp>
     </p:spTree>
     <p:extLst>
       <p:ext uri="{BB962C8B-B14F-4D97-AF65-F5344CB8AC3E}">
-        <p14:creationId xmlns:p14="http://schemas.microsoft.com/office/powerpoint/2010/main" val="771380864"/>
+        <p14:creationId xmlns:p14="http://schemas.microsoft.com/office/powerpoint/2010/main" val="1820606397"/>
       </p:ext>
     </p:extLst>
   </p:cSld>
@@ -3416,7 +3443,7 @@
         <p:spPr>
           <a:xfrm>
             <a:off x="1313447" y="920416"/>
-            <a:ext cx="10719601" cy="1200329"/>
+            <a:ext cx="9360255" cy="1200329"/>
           </a:xfrm>
           <a:prstGeom prst="rect">
             <a:avLst/>
@@ -3432,109 +3459,132 @@
             <a:r>
               <a:rPr lang="en-US" sz="2400" smtClean="0">
                 <a:solidFill>
-                  <a:srgbClr val="0070C0"/>
-                </a:solidFill>
-                <a:latin typeface="Consolas" panose="020B0609020204030204" pitchFamily="49" charset="0"/>
-              </a:rPr>
-              <a:t>int</a:t>
+                  <a:schemeClr val="bg1">
+                    <a:lumMod val="85000"/>
+                  </a:schemeClr>
+                </a:solidFill>
+                <a:latin typeface="Consolas" panose="020B0609020204030204" pitchFamily="49" charset="0"/>
+              </a:rPr>
+              <a:t>int age = 24;</a:t>
+            </a:r>
+            <a:endParaRPr lang="da-DK" sz="2400">
+              <a:solidFill>
+                <a:schemeClr val="bg1">
+                  <a:lumMod val="85000"/>
+                </a:schemeClr>
+              </a:solidFill>
+              <a:latin typeface="Consolas" panose="020B0609020204030204" pitchFamily="49" charset="0"/>
+            </a:endParaRPr>
+          </a:p>
+          <a:p>
+            <a:r>
+              <a:rPr lang="en-US" sz="2400">
+                <a:solidFill>
+                  <a:schemeClr val="bg1">
+                    <a:lumMod val="85000"/>
+                  </a:schemeClr>
+                </a:solidFill>
+                <a:latin typeface="Consolas" panose="020B0609020204030204" pitchFamily="49" charset="0"/>
+              </a:rPr>
+              <a:t>double</a:t>
             </a:r>
             <a:r>
               <a:rPr lang="en-US" sz="2400" smtClean="0">
-                <a:latin typeface="Consolas" panose="020B0609020204030204" pitchFamily="49" charset="0"/>
-              </a:rPr>
-              <a:t> age = 24;</a:t>
+                <a:solidFill>
+                  <a:schemeClr val="bg1">
+                    <a:lumMod val="85000"/>
+                  </a:schemeClr>
+                </a:solidFill>
+                <a:latin typeface="Consolas" panose="020B0609020204030204" pitchFamily="49" charset="0"/>
+              </a:rPr>
+              <a:t> someNumber </a:t>
+            </a:r>
+            <a:r>
+              <a:rPr lang="en-US" sz="2400">
+                <a:solidFill>
+                  <a:schemeClr val="bg1">
+                    <a:lumMod val="85000"/>
+                  </a:schemeClr>
+                </a:solidFill>
+                <a:latin typeface="Consolas" panose="020B0609020204030204" pitchFamily="49" charset="0"/>
+              </a:rPr>
+              <a:t>= </a:t>
+            </a:r>
+            <a:r>
+              <a:rPr lang="en-US" sz="2400" smtClean="0">
+                <a:solidFill>
+                  <a:schemeClr val="bg1">
+                    <a:lumMod val="85000"/>
+                  </a:schemeClr>
+                </a:solidFill>
+                <a:latin typeface="Consolas" panose="020B0609020204030204" pitchFamily="49" charset="0"/>
+              </a:rPr>
+              <a:t>1.3;</a:t>
+            </a:r>
+            <a:endParaRPr lang="da-DK" sz="2400">
+              <a:solidFill>
+                <a:schemeClr val="bg1">
+                  <a:lumMod val="85000"/>
+                </a:schemeClr>
+              </a:solidFill>
+              <a:latin typeface="Consolas" panose="020B0609020204030204" pitchFamily="49" charset="0"/>
+            </a:endParaRPr>
+          </a:p>
+          <a:p>
+            <a:r>
+              <a:rPr lang="en-US" sz="2400" smtClean="0">
+                <a:solidFill>
+                  <a:schemeClr val="accent6">
+                    <a:lumMod val="75000"/>
+                  </a:schemeClr>
+                </a:solidFill>
+                <a:latin typeface="Consolas" panose="020B0609020204030204" pitchFamily="49" charset="0"/>
+              </a:rPr>
+              <a:t>Console</a:t>
+            </a:r>
+            <a:r>
+              <a:rPr lang="en-US" sz="2400" smtClean="0">
+                <a:latin typeface="Consolas" panose="020B0609020204030204" pitchFamily="49" charset="0"/>
+              </a:rPr>
+              <a:t>.WriteLine</a:t>
+            </a:r>
+            <a:r>
+              <a:rPr lang="en-US" sz="2400">
+                <a:solidFill>
+                  <a:srgbClr val="C00000"/>
+                </a:solidFill>
+                <a:latin typeface="Consolas" panose="020B0609020204030204" pitchFamily="49" charset="0"/>
+              </a:rPr>
+              <a:t>("Dividing age by 1.3 is " </a:t>
+            </a:r>
+            <a:r>
+              <a:rPr lang="en-US" sz="2400">
+                <a:latin typeface="Consolas" panose="020B0609020204030204" pitchFamily="49" charset="0"/>
+              </a:rPr>
+              <a:t>+ </a:t>
+            </a:r>
+            <a:r>
+              <a:rPr lang="en-US" sz="2400" b="1" smtClean="0">
+                <a:latin typeface="Consolas" panose="020B0609020204030204" pitchFamily="49" charset="0"/>
+              </a:rPr>
+              <a:t>24/1.3</a:t>
+            </a:r>
+            <a:r>
+              <a:rPr lang="en-US" sz="2400" smtClean="0">
+                <a:latin typeface="Consolas" panose="020B0609020204030204" pitchFamily="49" charset="0"/>
+              </a:rPr>
+              <a:t>);</a:t>
             </a:r>
             <a:endParaRPr lang="da-DK" sz="2400">
               <a:latin typeface="Consolas" panose="020B0609020204030204" pitchFamily="49" charset="0"/>
             </a:endParaRPr>
           </a:p>
-          <a:p>
-            <a:r>
-              <a:rPr lang="en-US" sz="2400">
-                <a:solidFill>
-                  <a:srgbClr val="0070C0"/>
-                </a:solidFill>
-                <a:latin typeface="Consolas" panose="020B0609020204030204" pitchFamily="49" charset="0"/>
-              </a:rPr>
-              <a:t>double</a:t>
-            </a:r>
-            <a:r>
-              <a:rPr lang="en-US" sz="2400" smtClean="0">
-                <a:latin typeface="Consolas" panose="020B0609020204030204" pitchFamily="49" charset="0"/>
-              </a:rPr>
-              <a:t> someNumber </a:t>
-            </a:r>
-            <a:r>
-              <a:rPr lang="en-US" sz="2400">
-                <a:latin typeface="Consolas" panose="020B0609020204030204" pitchFamily="49" charset="0"/>
-              </a:rPr>
-              <a:t>= </a:t>
-            </a:r>
-            <a:r>
-              <a:rPr lang="en-US" sz="2400" smtClean="0">
-                <a:latin typeface="Consolas" panose="020B0609020204030204" pitchFamily="49" charset="0"/>
-              </a:rPr>
-              <a:t>1.3;</a:t>
-            </a:r>
-            <a:endParaRPr lang="da-DK" sz="2400">
-              <a:latin typeface="Consolas" panose="020B0609020204030204" pitchFamily="49" charset="0"/>
-            </a:endParaRPr>
-          </a:p>
-          <a:p>
-            <a:r>
-              <a:rPr lang="en-US" sz="2400" smtClean="0">
-                <a:solidFill>
-                  <a:schemeClr val="accent6">
-                    <a:lumMod val="75000"/>
-                  </a:schemeClr>
-                </a:solidFill>
-                <a:latin typeface="Consolas" panose="020B0609020204030204" pitchFamily="49" charset="0"/>
-              </a:rPr>
-              <a:t>Console</a:t>
-            </a:r>
-            <a:r>
-              <a:rPr lang="en-US" sz="2400" smtClean="0">
-                <a:latin typeface="Consolas" panose="020B0609020204030204" pitchFamily="49" charset="0"/>
-              </a:rPr>
-              <a:t>.WriteLine</a:t>
-            </a:r>
-            <a:r>
-              <a:rPr lang="en-US" sz="2400">
-                <a:solidFill>
-                  <a:srgbClr val="C00000"/>
-                </a:solidFill>
-                <a:latin typeface="Consolas" panose="020B0609020204030204" pitchFamily="49" charset="0"/>
-              </a:rPr>
-              <a:t>("Dividing age by 1.3 is " </a:t>
-            </a:r>
-            <a:r>
-              <a:rPr lang="en-US" sz="2400">
-                <a:latin typeface="Consolas" panose="020B0609020204030204" pitchFamily="49" charset="0"/>
-              </a:rPr>
-              <a:t>+ </a:t>
-            </a:r>
-            <a:r>
-              <a:rPr lang="en-US" sz="2400" b="1">
-                <a:latin typeface="Consolas" panose="020B0609020204030204" pitchFamily="49" charset="0"/>
-              </a:rPr>
-              <a:t>age/someNumber</a:t>
-            </a:r>
-            <a:r>
-              <a:rPr lang="en-US" sz="2400">
-                <a:latin typeface="Consolas" panose="020B0609020204030204" pitchFamily="49" charset="0"/>
-              </a:rPr>
-              <a:t>);</a:t>
-            </a:r>
-            <a:endParaRPr lang="da-DK" sz="2400">
-              <a:latin typeface="Consolas" panose="020B0609020204030204" pitchFamily="49" charset="0"/>
-            </a:endParaRPr>
-          </a:p>
         </p:txBody>
       </p:sp>
     </p:spTree>
     <p:extLst>
       <p:ext uri="{BB962C8B-B14F-4D97-AF65-F5344CB8AC3E}">
-        <p14:creationId xmlns:p14="http://schemas.microsoft.com/office/powerpoint/2010/main" val="1820606397"/>
+        <p14:creationId xmlns:p14="http://schemas.microsoft.com/office/powerpoint/2010/main" val="1848524830"/>
       </p:ext>
     </p:extLst>
   </p:cSld>
@@ -3577,7 +3627,7 @@
         <p:spPr>
           <a:xfrm>
             <a:off x="1313447" y="920416"/>
-            <a:ext cx="9360255" cy="1200329"/>
+            <a:ext cx="10140616" cy="1200329"/>
           </a:xfrm>
           <a:prstGeom prst="rect">
             <a:avLst/>
@@ -3585,7 +3635,7 @@
           <a:noFill/>
         </p:spPr>
         <p:txBody>
-          <a:bodyPr wrap="none" rtlCol="0">
+          <a:bodyPr wrap="square" rtlCol="0">
             <a:spAutoFit/>
           </a:bodyPr>
           <a:lstStyle/>
@@ -3701,7 +3751,7 @@
               <a:rPr lang="en-US" sz="2400" b="1" smtClean="0">
                 <a:latin typeface="Consolas" panose="020B0609020204030204" pitchFamily="49" charset="0"/>
               </a:rPr>
-              <a:t>24/1.3</a:t>
+              <a:t>24.0/1.3</a:t>
             </a:r>
             <a:r>
               <a:rPr lang="en-US" sz="2400" smtClean="0">
@@ -3718,7 +3768,7 @@
     </p:spTree>
     <p:extLst>
       <p:ext uri="{BB962C8B-B14F-4D97-AF65-F5344CB8AC3E}">
-        <p14:creationId xmlns:p14="http://schemas.microsoft.com/office/powerpoint/2010/main" val="1848524830"/>
+        <p14:creationId xmlns:p14="http://schemas.microsoft.com/office/powerpoint/2010/main" val="2623863964"/>
       </p:ext>
     </p:extLst>
   </p:cSld>
@@ -3885,7 +3935,7 @@
               <a:rPr lang="en-US" sz="2400" b="1" smtClean="0">
                 <a:latin typeface="Consolas" panose="020B0609020204030204" pitchFamily="49" charset="0"/>
               </a:rPr>
-              <a:t>24.0/1.3</a:t>
+              <a:t>18.462</a:t>
             </a:r>
             <a:r>
               <a:rPr lang="en-US" sz="2400" smtClean="0">
@@ -3902,7 +3952,7 @@
     </p:spTree>
     <p:extLst>
       <p:ext uri="{BB962C8B-B14F-4D97-AF65-F5344CB8AC3E}">
-        <p14:creationId xmlns:p14="http://schemas.microsoft.com/office/powerpoint/2010/main" val="2623863964"/>
+        <p14:creationId xmlns:p14="http://schemas.microsoft.com/office/powerpoint/2010/main" val="1839984139"/>
       </p:ext>
     </p:extLst>
   </p:cSld>
@@ -4066,10 +4116,22 @@
               <a:t>+ </a:t>
             </a:r>
             <a:r>
+              <a:rPr lang="en-US" sz="2400" b="1">
+                <a:solidFill>
+                  <a:srgbClr val="C00000"/>
+                </a:solidFill>
+                <a:latin typeface="Consolas" panose="020B0609020204030204" pitchFamily="49" charset="0"/>
+              </a:rPr>
+              <a:t>"18.462</a:t>
+            </a:r>
+            <a:r>
               <a:rPr lang="en-US" sz="2400" b="1" smtClean="0">
-                <a:latin typeface="Consolas" panose="020B0609020204030204" pitchFamily="49" charset="0"/>
-              </a:rPr>
-              <a:t>18.462</a:t>
+                <a:solidFill>
+                  <a:srgbClr val="C00000"/>
+                </a:solidFill>
+                <a:latin typeface="Consolas" panose="020B0609020204030204" pitchFamily="49" charset="0"/>
+              </a:rPr>
+              <a:t>"</a:t>
             </a:r>
             <a:r>
               <a:rPr lang="en-US" sz="2400" smtClean="0">
@@ -4086,7 +4148,7 @@
     </p:spTree>
     <p:extLst>
       <p:ext uri="{BB962C8B-B14F-4D97-AF65-F5344CB8AC3E}">
-        <p14:creationId xmlns:p14="http://schemas.microsoft.com/office/powerpoint/2010/main" val="1839984139"/>
+        <p14:creationId xmlns:p14="http://schemas.microsoft.com/office/powerpoint/2010/main" val="4227605885"/>
       </p:ext>
     </p:extLst>
   </p:cSld>
@@ -4206,213 +4268,6 @@
                 <a:latin typeface="Consolas" panose="020B0609020204030204" pitchFamily="49" charset="0"/>
               </a:rPr>
               <a:t>1.3;</a:t>
-            </a:r>
-            <a:endParaRPr lang="da-DK" sz="2400">
-              <a:solidFill>
-                <a:schemeClr val="bg1">
-                  <a:lumMod val="85000"/>
-                </a:schemeClr>
-              </a:solidFill>
-              <a:latin typeface="Consolas" panose="020B0609020204030204" pitchFamily="49" charset="0"/>
-            </a:endParaRPr>
-          </a:p>
-          <a:p>
-            <a:r>
-              <a:rPr lang="en-US" sz="2400" smtClean="0">
-                <a:solidFill>
-                  <a:schemeClr val="accent6">
-                    <a:lumMod val="75000"/>
-                  </a:schemeClr>
-                </a:solidFill>
-                <a:latin typeface="Consolas" panose="020B0609020204030204" pitchFamily="49" charset="0"/>
-              </a:rPr>
-              <a:t>Console</a:t>
-            </a:r>
-            <a:r>
-              <a:rPr lang="en-US" sz="2400" smtClean="0">
-                <a:latin typeface="Consolas" panose="020B0609020204030204" pitchFamily="49" charset="0"/>
-              </a:rPr>
-              <a:t>.WriteLine</a:t>
-            </a:r>
-            <a:r>
-              <a:rPr lang="en-US" sz="2400">
-                <a:solidFill>
-                  <a:srgbClr val="C00000"/>
-                </a:solidFill>
-                <a:latin typeface="Consolas" panose="020B0609020204030204" pitchFamily="49" charset="0"/>
-              </a:rPr>
-              <a:t>("Dividing age by 1.3 is " </a:t>
-            </a:r>
-            <a:r>
-              <a:rPr lang="en-US" sz="2400">
-                <a:latin typeface="Consolas" panose="020B0609020204030204" pitchFamily="49" charset="0"/>
-              </a:rPr>
-              <a:t>+ </a:t>
-            </a:r>
-            <a:r>
-              <a:rPr lang="en-US" sz="2400" b="1">
-                <a:solidFill>
-                  <a:srgbClr val="C00000"/>
-                </a:solidFill>
-                <a:latin typeface="Consolas" panose="020B0609020204030204" pitchFamily="49" charset="0"/>
-              </a:rPr>
-              <a:t>"18.462</a:t>
-            </a:r>
-            <a:r>
-              <a:rPr lang="en-US" sz="2400" b="1" smtClean="0">
-                <a:solidFill>
-                  <a:srgbClr val="C00000"/>
-                </a:solidFill>
-                <a:latin typeface="Consolas" panose="020B0609020204030204" pitchFamily="49" charset="0"/>
-              </a:rPr>
-              <a:t>"</a:t>
-            </a:r>
-            <a:r>
-              <a:rPr lang="en-US" sz="2400" smtClean="0">
-                <a:latin typeface="Consolas" panose="020B0609020204030204" pitchFamily="49" charset="0"/>
-              </a:rPr>
-              <a:t>);</a:t>
-            </a:r>
-            <a:endParaRPr lang="da-DK" sz="2400">
-              <a:latin typeface="Consolas" panose="020B0609020204030204" pitchFamily="49" charset="0"/>
-            </a:endParaRPr>
-          </a:p>
-        </p:txBody>
-      </p:sp>
-    </p:spTree>
-    <p:extLst>
-      <p:ext uri="{BB962C8B-B14F-4D97-AF65-F5344CB8AC3E}">
-        <p14:creationId xmlns:p14="http://schemas.microsoft.com/office/powerpoint/2010/main" val="4227605885"/>
-      </p:ext>
-    </p:extLst>
-  </p:cSld>
-  <p:clrMapOvr>
-    <a:masterClrMapping/>
-  </p:clrMapOvr>
-  <p:timing>
-    <p:tnLst>
-      <p:par>
-        <p:cTn id="1" dur="indefinite" restart="never" nodeType="tmRoot"/>
-      </p:par>
-    </p:tnLst>
-  </p:timing>
-</p:sld>
-</file>
-
-<file path=ppt/slides/slide9.xml><?xml version="1.0" encoding="utf-8"?>
-<p:sld xmlns:a="http://schemas.openxmlformats.org/drawingml/2006/main" xmlns:r="http://schemas.openxmlformats.org/officeDocument/2006/relationships" xmlns:p="http://schemas.openxmlformats.org/presentationml/2006/main">
-  <p:cSld>
-    <p:spTree>
-      <p:nvGrpSpPr>
-        <p:cNvPr id="1" name=""/>
-        <p:cNvGrpSpPr/>
-        <p:nvPr/>
-      </p:nvGrpSpPr>
-      <p:grpSpPr>
-        <a:xfrm>
-          <a:off x="0" y="0"/>
-          <a:ext cx="0" cy="0"/>
-          <a:chOff x="0" y="0"/>
-          <a:chExt cx="0" cy="0"/>
-        </a:xfrm>
-      </p:grpSpPr>
-      <p:sp>
-        <p:nvSpPr>
-          <p:cNvPr id="6" name="Tekstfelt 5"/>
-          <p:cNvSpPr txBox="1"/>
-          <p:nvPr/>
-        </p:nvSpPr>
-        <p:spPr>
-          <a:xfrm>
-            <a:off x="1313447" y="920416"/>
-            <a:ext cx="10140616" cy="1200329"/>
-          </a:xfrm>
-          <a:prstGeom prst="rect">
-            <a:avLst/>
-          </a:prstGeom>
-          <a:noFill/>
-        </p:spPr>
-        <p:txBody>
-          <a:bodyPr wrap="square" rtlCol="0">
-            <a:spAutoFit/>
-          </a:bodyPr>
-          <a:lstStyle/>
-          <a:p>
-            <a:r>
-              <a:rPr lang="en-US" sz="2400" smtClean="0">
-                <a:solidFill>
-                  <a:schemeClr val="bg1">
-                    <a:lumMod val="85000"/>
-                  </a:schemeClr>
-                </a:solidFill>
-                <a:latin typeface="Consolas" panose="020B0609020204030204" pitchFamily="49" charset="0"/>
-              </a:rPr>
-              <a:t>int age = 24;</a:t>
-            </a:r>
-            <a:endParaRPr lang="da-DK" sz="2400">
-              <a:solidFill>
-                <a:schemeClr val="bg1">
-                  <a:lumMod val="85000"/>
-                </a:schemeClr>
-              </a:solidFill>
-              <a:latin typeface="Consolas" panose="020B0609020204030204" pitchFamily="49" charset="0"/>
-            </a:endParaRPr>
-          </a:p>
-          <a:p>
-            <a:r>
-              <a:rPr lang="en-US" sz="2400">
-                <a:solidFill>
-                  <a:schemeClr val="bg1">
-                    <a:lumMod val="85000"/>
-                  </a:schemeClr>
-                </a:solidFill>
-                <a:latin typeface="Consolas" panose="020B0609020204030204" pitchFamily="49" charset="0"/>
-              </a:rPr>
-              <a:t>double</a:t>
-            </a:r>
-            <a:r>
-              <a:rPr lang="en-US" sz="2400" smtClean="0">
-                <a:solidFill>
-                  <a:schemeClr val="bg1">
-                    <a:lumMod val="85000"/>
-                  </a:schemeClr>
-                </a:solidFill>
-                <a:latin typeface="Consolas" panose="020B0609020204030204" pitchFamily="49" charset="0"/>
-              </a:rPr>
-              <a:t> someNumber </a:t>
-            </a:r>
-            <a:r>
-              <a:rPr lang="en-US" sz="2400">
-                <a:solidFill>
-                  <a:schemeClr val="bg1">
-                    <a:lumMod val="85000"/>
-                  </a:schemeClr>
-                </a:solidFill>
-                <a:latin typeface="Consolas" panose="020B0609020204030204" pitchFamily="49" charset="0"/>
-              </a:rPr>
-              <a:t>= </a:t>
-            </a:r>
-            <a:r>
-              <a:rPr lang="en-US" sz="2400" smtClean="0">
-                <a:solidFill>
-                  <a:schemeClr val="bg1">
-                    <a:lumMod val="85000"/>
-                  </a:schemeClr>
-                </a:solidFill>
-                <a:latin typeface="Consolas" panose="020B0609020204030204" pitchFamily="49" charset="0"/>
-              </a:rPr>
-              <a:t>1.3</a:t>
-            </a:r>
-            <a:r>
-              <a:rPr lang="en-US" sz="2400" smtClean="0">
-                <a:solidFill>
-                  <a:schemeClr val="bg1">
-                    <a:lumMod val="85000"/>
-                  </a:schemeClr>
-                </a:solidFill>
-                <a:latin typeface="Consolas" panose="020B0609020204030204" pitchFamily="49" charset="0"/>
-              </a:rPr>
-              <a:t>;</a:t>
             </a:r>
             <a:endParaRPr lang="da-DK" sz="2400" smtClean="0">
               <a:solidFill>

</xml_diff>